<commit_message>
Done first draft of joint toy.
</commit_message>
<xml_diff>
--- a/Doxygen/physics/8. Box2D Joint Toy/figures.pptx
+++ b/Doxygen/physics/8. Box2D Joint Toy/figures.pptx
@@ -204,7 +204,7 @@
           <a:p>
             <a:fld id="{E54D3832-E819-4F21-A702-2A3BF11FDE4B}" type="datetimeFigureOut">
               <a:rPr lang="en-US" smtClean="0"/>
-              <a:t>4/8/2024</a:t>
+              <a:t>9/16/2024</a:t>
             </a:fld>
             <a:endParaRPr lang="en-US"/>
           </a:p>
@@ -13149,417 +13149,396 @@
           <a:chExt cx="0" cy="0"/>
         </a:xfrm>
       </p:grpSpPr>
-      <p:grpSp>
-        <p:nvGrpSpPr>
-          <p:cNvPr id="4" name="Group 3">
+      <p:sp>
+        <p:nvSpPr>
+          <p:cNvPr id="5" name="Arc 4">
             <a:extLst>
               <a:ext uri="{FF2B5EF4-FFF2-40B4-BE49-F238E27FC236}">
-                <a16:creationId xmlns:a16="http://schemas.microsoft.com/office/drawing/2014/main" id="{7C604BB9-E73D-5697-1DA4-54607747E48A}"/>
+                <a16:creationId xmlns:a16="http://schemas.microsoft.com/office/drawing/2014/main" id="{50269E7F-DF48-CC3F-9649-3CC2719B2CA8}"/>
               </a:ext>
             </a:extLst>
           </p:cNvPr>
-          <p:cNvGrpSpPr/>
+          <p:cNvSpPr/>
           <p:nvPr/>
-        </p:nvGrpSpPr>
-        <p:grpSpPr>
+        </p:nvSpPr>
+        <p:spPr>
+          <a:xfrm rot="5400000">
+            <a:off x="454152" y="3718015"/>
+            <a:ext cx="2198935" cy="2198935"/>
+          </a:xfrm>
+          <a:prstGeom prst="arc">
+            <a:avLst>
+              <a:gd name="adj1" fmla="val 18979528"/>
+              <a:gd name="adj2" fmla="val 0"/>
+            </a:avLst>
+          </a:prstGeom>
+          <a:ln w="25400">
+            <a:solidFill>
+              <a:schemeClr val="tx1"/>
+            </a:solidFill>
+            <a:headEnd type="arrow" w="med" len="lg"/>
+            <a:tailEnd type="arrow" w="med" len="lg"/>
+          </a:ln>
+          <a:effectLst>
+            <a:outerShdw blurRad="50800" dist="38100" dir="2700000" algn="tl" rotWithShape="0">
+              <a:prstClr val="black">
+                <a:alpha val="40000"/>
+              </a:prstClr>
+            </a:outerShdw>
+          </a:effectLst>
+        </p:spPr>
+        <p:style>
+          <a:lnRef idx="1">
+            <a:schemeClr val="accent1"/>
+          </a:lnRef>
+          <a:fillRef idx="0">
+            <a:schemeClr val="accent1"/>
+          </a:fillRef>
+          <a:effectRef idx="0">
+            <a:schemeClr val="accent1"/>
+          </a:effectRef>
+          <a:fontRef idx="minor">
+            <a:schemeClr val="tx1"/>
+          </a:fontRef>
+        </p:style>
+        <p:txBody>
+          <a:bodyPr rtlCol="0" anchor="ctr"/>
+          <a:lstStyle/>
+          <a:p>
+            <a:pPr algn="ctr"/>
+            <a:endParaRPr lang="en-US"/>
+          </a:p>
+        </p:txBody>
+      </p:sp>
+      <p:sp>
+        <p:nvSpPr>
+          <p:cNvPr id="6" name="Oval 5">
+            <a:extLst>
+              <a:ext uri="{FF2B5EF4-FFF2-40B4-BE49-F238E27FC236}">
+                <a16:creationId xmlns:a16="http://schemas.microsoft.com/office/drawing/2014/main" id="{94DAF57A-4DA3-0732-BB50-B1874DE5711C}"/>
+              </a:ext>
+            </a:extLst>
+          </p:cNvPr>
+          <p:cNvSpPr/>
+          <p:nvPr/>
+        </p:nvSpPr>
+        <p:spPr>
           <a:xfrm>
-            <a:off x="454152" y="3718015"/>
-            <a:ext cx="2198935" cy="2585525"/>
-            <a:chOff x="323298" y="3548732"/>
-            <a:chExt cx="2198935" cy="2585525"/>
+            <a:off x="656001" y="3922907"/>
+            <a:ext cx="1795238" cy="1795238"/>
           </a:xfrm>
-        </p:grpSpPr>
-        <p:sp>
-          <p:nvSpPr>
-            <p:cNvPr id="5" name="Arc 4">
-              <a:extLst>
-                <a:ext uri="{FF2B5EF4-FFF2-40B4-BE49-F238E27FC236}">
-                  <a16:creationId xmlns:a16="http://schemas.microsoft.com/office/drawing/2014/main" id="{50269E7F-DF48-CC3F-9649-3CC2719B2CA8}"/>
-                </a:ext>
-              </a:extLst>
-            </p:cNvPr>
-            <p:cNvSpPr/>
-            <p:nvPr/>
-          </p:nvSpPr>
-          <p:spPr>
-            <a:xfrm rot="5400000">
-              <a:off x="323298" y="3548732"/>
-              <a:ext cx="2198935" cy="2198935"/>
-            </a:xfrm>
-            <a:prstGeom prst="arc">
-              <a:avLst>
-                <a:gd name="adj1" fmla="val 18979528"/>
-                <a:gd name="adj2" fmla="val 0"/>
-              </a:avLst>
-            </a:prstGeom>
-            <a:ln w="25400">
-              <a:solidFill>
-                <a:schemeClr val="tx1"/>
-              </a:solidFill>
-              <a:headEnd type="arrow" w="med" len="lg"/>
-              <a:tailEnd type="arrow" w="med" len="lg"/>
-            </a:ln>
-            <a:effectLst>
-              <a:outerShdw blurRad="50800" dist="38100" dir="2700000" algn="tl" rotWithShape="0">
-                <a:prstClr val="black">
-                  <a:alpha val="40000"/>
-                </a:prstClr>
-              </a:outerShdw>
-            </a:effectLst>
-          </p:spPr>
-          <p:style>
-            <a:lnRef idx="1">
-              <a:schemeClr val="accent1"/>
-            </a:lnRef>
-            <a:fillRef idx="0">
-              <a:schemeClr val="accent1"/>
-            </a:fillRef>
-            <a:effectRef idx="0">
-              <a:schemeClr val="accent1"/>
-            </a:effectRef>
-            <a:fontRef idx="minor">
+          <a:prstGeom prst="ellipse">
+            <a:avLst/>
+          </a:prstGeom>
+          <a:solidFill>
+            <a:srgbClr val="FFFF99"/>
+          </a:solidFill>
+          <a:ln w="25400">
+            <a:solidFill>
               <a:schemeClr val="tx1"/>
-            </a:fontRef>
-          </p:style>
-          <p:txBody>
-            <a:bodyPr rtlCol="0" anchor="ctr"/>
-            <a:lstStyle/>
-            <a:p>
-              <a:pPr algn="ctr"/>
-              <a:endParaRPr lang="en-US"/>
-            </a:p>
-          </p:txBody>
-        </p:sp>
-        <p:sp>
-          <p:nvSpPr>
-            <p:cNvPr id="6" name="Oval 5">
-              <a:extLst>
-                <a:ext uri="{FF2B5EF4-FFF2-40B4-BE49-F238E27FC236}">
-                  <a16:creationId xmlns:a16="http://schemas.microsoft.com/office/drawing/2014/main" id="{94DAF57A-4DA3-0732-BB50-B1874DE5711C}"/>
-                </a:ext>
-              </a:extLst>
-            </p:cNvPr>
-            <p:cNvSpPr/>
-            <p:nvPr/>
-          </p:nvSpPr>
-          <p:spPr>
-            <a:xfrm>
-              <a:off x="525147" y="3753624"/>
-              <a:ext cx="1795238" cy="1795238"/>
-            </a:xfrm>
-            <a:prstGeom prst="ellipse">
-              <a:avLst/>
-            </a:prstGeom>
+            </a:solidFill>
+          </a:ln>
+        </p:spPr>
+        <p:style>
+          <a:lnRef idx="1">
+            <a:schemeClr val="accent1"/>
+          </a:lnRef>
+          <a:fillRef idx="0">
+            <a:schemeClr val="accent1"/>
+          </a:fillRef>
+          <a:effectRef idx="0">
+            <a:schemeClr val="accent1"/>
+          </a:effectRef>
+          <a:fontRef idx="minor">
+            <a:schemeClr val="tx1"/>
+          </a:fontRef>
+        </p:style>
+        <p:txBody>
+          <a:bodyPr rtlCol="0" anchor="ctr"/>
+          <a:lstStyle/>
+          <a:p>
+            <a:pPr algn="ctr"/>
+            <a:endParaRPr lang="en-US"/>
+          </a:p>
+        </p:txBody>
+      </p:sp>
+      <p:cxnSp>
+        <p:nvCxnSpPr>
+          <p:cNvPr id="7" name="Straight Connector 6">
+            <a:extLst>
+              <a:ext uri="{FF2B5EF4-FFF2-40B4-BE49-F238E27FC236}">
+                <a16:creationId xmlns:a16="http://schemas.microsoft.com/office/drawing/2014/main" id="{17B8C484-AC17-1170-D54E-84794FB5E5AC}"/>
+              </a:ext>
+            </a:extLst>
+          </p:cNvPr>
+          <p:cNvCxnSpPr>
+            <a:endCxn id="6" idx="4"/>
+          </p:cNvCxnSpPr>
+          <p:nvPr/>
+        </p:nvCxnSpPr>
+        <p:spPr>
+          <a:xfrm>
+            <a:off x="1553620" y="4817483"/>
+            <a:ext cx="0" cy="900662"/>
+          </a:xfrm>
+          <a:prstGeom prst="line">
+            <a:avLst/>
+          </a:prstGeom>
+          <a:ln w="25400" cap="rnd">
             <a:solidFill>
-              <a:srgbClr val="FFFF99"/>
+              <a:schemeClr val="tx1"/>
             </a:solidFill>
-            <a:ln w="25400">
-              <a:solidFill>
-                <a:schemeClr val="tx1"/>
-              </a:solidFill>
-            </a:ln>
-          </p:spPr>
-          <p:style>
-            <a:lnRef idx="1">
-              <a:schemeClr val="accent1"/>
-            </a:lnRef>
-            <a:fillRef idx="0">
-              <a:schemeClr val="accent1"/>
-            </a:fillRef>
-            <a:effectRef idx="0">
-              <a:schemeClr val="accent1"/>
-            </a:effectRef>
-            <a:fontRef idx="minor">
+          </a:ln>
+        </p:spPr>
+        <p:style>
+          <a:lnRef idx="1">
+            <a:schemeClr val="accent1"/>
+          </a:lnRef>
+          <a:fillRef idx="0">
+            <a:schemeClr val="accent1"/>
+          </a:fillRef>
+          <a:effectRef idx="0">
+            <a:schemeClr val="accent1"/>
+          </a:effectRef>
+          <a:fontRef idx="minor">
+            <a:schemeClr val="tx1"/>
+          </a:fontRef>
+        </p:style>
+      </p:cxnSp>
+      <p:cxnSp>
+        <p:nvCxnSpPr>
+          <p:cNvPr id="8" name="Straight Connector 7">
+            <a:extLst>
+              <a:ext uri="{FF2B5EF4-FFF2-40B4-BE49-F238E27FC236}">
+                <a16:creationId xmlns:a16="http://schemas.microsoft.com/office/drawing/2014/main" id="{A693A54F-CD42-B5F4-304A-7758A6834EC7}"/>
+              </a:ext>
+            </a:extLst>
+          </p:cNvPr>
+          <p:cNvCxnSpPr>
+            <a:endCxn id="6" idx="5"/>
+          </p:cNvCxnSpPr>
+          <p:nvPr/>
+        </p:nvCxnSpPr>
+        <p:spPr>
+          <a:xfrm>
+            <a:off x="1553620" y="4817483"/>
+            <a:ext cx="634712" cy="637755"/>
+          </a:xfrm>
+          <a:prstGeom prst="line">
+            <a:avLst/>
+          </a:prstGeom>
+          <a:ln w="25400" cap="rnd">
+            <a:solidFill>
               <a:schemeClr val="tx1"/>
-            </a:fontRef>
-          </p:style>
-          <p:txBody>
-            <a:bodyPr rtlCol="0" anchor="ctr"/>
-            <a:lstStyle/>
-            <a:p>
-              <a:pPr algn="ctr"/>
-              <a:endParaRPr lang="en-US"/>
-            </a:p>
-          </p:txBody>
-        </p:sp>
-        <p:cxnSp>
-          <p:nvCxnSpPr>
-            <p:cNvPr id="7" name="Straight Connector 6">
-              <a:extLst>
-                <a:ext uri="{FF2B5EF4-FFF2-40B4-BE49-F238E27FC236}">
-                  <a16:creationId xmlns:a16="http://schemas.microsoft.com/office/drawing/2014/main" id="{17B8C484-AC17-1170-D54E-84794FB5E5AC}"/>
-                </a:ext>
-              </a:extLst>
-            </p:cNvPr>
-            <p:cNvCxnSpPr>
-              <a:endCxn id="6" idx="4"/>
-            </p:cNvCxnSpPr>
-            <p:nvPr/>
-          </p:nvCxnSpPr>
-          <p:spPr>
-            <a:xfrm>
-              <a:off x="1422766" y="4648200"/>
-              <a:ext cx="0" cy="900662"/>
-            </a:xfrm>
-            <a:prstGeom prst="line">
-              <a:avLst/>
-            </a:prstGeom>
-            <a:ln w="25400" cap="rnd">
-              <a:solidFill>
-                <a:schemeClr val="tx1"/>
-              </a:solidFill>
-            </a:ln>
-          </p:spPr>
-          <p:style>
-            <a:lnRef idx="1">
-              <a:schemeClr val="accent1"/>
-            </a:lnRef>
-            <a:fillRef idx="0">
-              <a:schemeClr val="accent1"/>
-            </a:fillRef>
-            <a:effectRef idx="0">
-              <a:schemeClr val="accent1"/>
-            </a:effectRef>
-            <a:fontRef idx="minor">
-              <a:schemeClr val="tx1"/>
-            </a:fontRef>
-          </p:style>
-        </p:cxnSp>
-        <p:cxnSp>
-          <p:nvCxnSpPr>
-            <p:cNvPr id="8" name="Straight Connector 7">
-              <a:extLst>
-                <a:ext uri="{FF2B5EF4-FFF2-40B4-BE49-F238E27FC236}">
-                  <a16:creationId xmlns:a16="http://schemas.microsoft.com/office/drawing/2014/main" id="{A693A54F-CD42-B5F4-304A-7758A6834EC7}"/>
-                </a:ext>
-              </a:extLst>
-            </p:cNvPr>
-            <p:cNvCxnSpPr>
-              <a:endCxn id="6" idx="5"/>
-            </p:cNvCxnSpPr>
-            <p:nvPr/>
-          </p:nvCxnSpPr>
-          <p:spPr>
-            <a:xfrm>
-              <a:off x="1422766" y="4648200"/>
-              <a:ext cx="634712" cy="637755"/>
-            </a:xfrm>
-            <a:prstGeom prst="line">
-              <a:avLst/>
-            </a:prstGeom>
-            <a:ln w="25400" cap="rnd">
-              <a:solidFill>
-                <a:schemeClr val="tx1"/>
-              </a:solidFill>
-            </a:ln>
-          </p:spPr>
-          <p:style>
-            <a:lnRef idx="1">
-              <a:schemeClr val="accent1"/>
-            </a:lnRef>
-            <a:fillRef idx="0">
-              <a:schemeClr val="accent1"/>
-            </a:fillRef>
-            <a:effectRef idx="0">
-              <a:schemeClr val="accent1"/>
-            </a:effectRef>
-            <a:fontRef idx="minor">
-              <a:schemeClr val="tx1"/>
-            </a:fontRef>
-          </p:style>
-        </p:cxnSp>
-        <mc:AlternateContent xmlns:mc="http://schemas.openxmlformats.org/markup-compatibility/2006">
-          <mc:Choice xmlns:a14="http://schemas.microsoft.com/office/drawing/2010/main" Requires="a14">
-            <p:sp>
-              <p:nvSpPr>
-                <p:cNvPr id="9" name="TextBox 8">
-                  <a:extLst>
-                    <a:ext uri="{FF2B5EF4-FFF2-40B4-BE49-F238E27FC236}">
-                      <a16:creationId xmlns:a16="http://schemas.microsoft.com/office/drawing/2014/main" id="{69848FE8-6C0D-07FD-9867-8D17363ED48A}"/>
-                    </a:ext>
-                  </a:extLst>
-                </p:cNvPr>
-                <p:cNvSpPr txBox="1"/>
-                <p:nvPr/>
-              </p:nvSpPr>
-              <p:spPr>
-                <a:xfrm>
-                  <a:off x="1620522" y="5681120"/>
-                  <a:ext cx="533400" cy="453137"/>
-                </a:xfrm>
-                <a:prstGeom prst="rect">
-                  <a:avLst/>
-                </a:prstGeom>
-                <a:noFill/>
-              </p:spPr>
-              <p:txBody>
-                <a:bodyPr wrap="square" rtlCol="0">
-                  <a:spAutoFit/>
-                </a:bodyPr>
-                <a:lstStyle/>
-                <a:p>
-                  <a:pPr algn="ctr"/>
-                  <a14:m>
+            </a:solidFill>
+          </a:ln>
+        </p:spPr>
+        <p:style>
+          <a:lnRef idx="1">
+            <a:schemeClr val="accent1"/>
+          </a:lnRef>
+          <a:fillRef idx="0">
+            <a:schemeClr val="accent1"/>
+          </a:fillRef>
+          <a:effectRef idx="0">
+            <a:schemeClr val="accent1"/>
+          </a:effectRef>
+          <a:fontRef idx="minor">
+            <a:schemeClr val="tx1"/>
+          </a:fontRef>
+        </p:style>
+      </p:cxnSp>
+      <mc:AlternateContent xmlns:mc="http://schemas.openxmlformats.org/markup-compatibility/2006">
+        <mc:Choice xmlns:a14="http://schemas.microsoft.com/office/drawing/2010/main" Requires="a14">
+          <p:sp>
+            <p:nvSpPr>
+              <p:cNvPr id="9" name="TextBox 8">
+                <a:extLst>
+                  <a:ext uri="{FF2B5EF4-FFF2-40B4-BE49-F238E27FC236}">
+                    <a16:creationId xmlns:a16="http://schemas.microsoft.com/office/drawing/2014/main" id="{69848FE8-6C0D-07FD-9867-8D17363ED48A}"/>
+                  </a:ext>
+                </a:extLst>
+              </p:cNvPr>
+              <p:cNvSpPr txBox="1"/>
+              <p:nvPr/>
+            </p:nvSpPr>
+            <p:spPr>
+              <a:xfrm>
+                <a:off x="1751376" y="5850403"/>
+                <a:ext cx="533400" cy="453137"/>
+              </a:xfrm>
+              <a:prstGeom prst="rect">
+                <a:avLst/>
+              </a:prstGeom>
+              <a:noFill/>
+            </p:spPr>
+            <p:txBody>
+              <a:bodyPr wrap="square" rtlCol="0">
+                <a:spAutoFit/>
+              </a:bodyPr>
+              <a:lstStyle/>
+              <a:p>
+                <a:pPr algn="ctr"/>
+                <a14:m>
+                  <m:oMath xmlns:m="http://schemas.openxmlformats.org/officeDocument/2006/math">
+                    <m:r>
+                      <a:rPr lang="en-US" sz="2400" b="0" i="1" smtClean="0">
+                        <a:latin typeface="Cambria Math" panose="02040503050406030204" pitchFamily="18" charset="0"/>
+                      </a:rPr>
+                      <m:t>𝑑</m:t>
+                    </m:r>
+                  </m:oMath>
+                </a14:m>
+                <a:r>
+                  <a:rPr lang="en-US" dirty="0"/>
+                  <a:t> </a:t>
+                </a:r>
+              </a:p>
+            </p:txBody>
+          </p:sp>
+        </mc:Choice>
+        <mc:Fallback>
+          <p:sp>
+            <p:nvSpPr>
+              <p:cNvPr id="9" name="TextBox 8">
+                <a:extLst>
+                  <a:ext uri="{FF2B5EF4-FFF2-40B4-BE49-F238E27FC236}">
+                    <a16:creationId xmlns:a16="http://schemas.microsoft.com/office/drawing/2014/main" id="{69848FE8-6C0D-07FD-9867-8D17363ED48A}"/>
+                  </a:ext>
+                </a:extLst>
+              </p:cNvPr>
+              <p:cNvSpPr txBox="1">
+                <a:spLocks noRot="1" noChangeAspect="1" noMove="1" noResize="1" noEditPoints="1" noAdjustHandles="1" noChangeArrowheads="1" noChangeShapeType="1" noTextEdit="1"/>
+              </p:cNvSpPr>
+              <p:nvPr/>
+            </p:nvSpPr>
+            <p:spPr>
+              <a:xfrm>
+                <a:off x="1751376" y="5850403"/>
+                <a:ext cx="533400" cy="453137"/>
+              </a:xfrm>
+              <a:prstGeom prst="rect">
+                <a:avLst/>
+              </a:prstGeom>
+              <a:blipFill>
+                <a:blip r:embed="rId2"/>
+                <a:stretch>
+                  <a:fillRect/>
+                </a:stretch>
+              </a:blipFill>
+            </p:spPr>
+            <p:txBody>
+              <a:bodyPr/>
+              <a:lstStyle/>
+              <a:p>
+                <a:r>
+                  <a:rPr lang="en-US">
+                    <a:noFill/>
+                  </a:rPr>
+                  <a:t> </a:t>
+                </a:r>
+              </a:p>
+            </p:txBody>
+          </p:sp>
+        </mc:Fallback>
+      </mc:AlternateContent>
+      <mc:AlternateContent xmlns:mc="http://schemas.openxmlformats.org/markup-compatibility/2006">
+        <mc:Choice xmlns:a14="http://schemas.microsoft.com/office/drawing/2010/main" Requires="a14">
+          <p:sp>
+            <p:nvSpPr>
+              <p:cNvPr id="10" name="TextBox 9">
+                <a:extLst>
+                  <a:ext uri="{FF2B5EF4-FFF2-40B4-BE49-F238E27FC236}">
+                    <a16:creationId xmlns:a16="http://schemas.microsoft.com/office/drawing/2014/main" id="{F41E5177-27A4-ADC7-AE35-2B2712768B5B}"/>
+                  </a:ext>
+                </a:extLst>
+              </p:cNvPr>
+              <p:cNvSpPr txBox="1"/>
+              <p:nvPr/>
+            </p:nvSpPr>
+            <p:spPr>
+              <a:xfrm>
+                <a:off x="1495946" y="4993573"/>
+                <a:ext cx="533400" cy="461665"/>
+              </a:xfrm>
+              <a:prstGeom prst="rect">
+                <a:avLst/>
+              </a:prstGeom>
+              <a:noFill/>
+            </p:spPr>
+            <p:txBody>
+              <a:bodyPr wrap="square" rtlCol="0">
+                <a:spAutoFit/>
+              </a:bodyPr>
+              <a:lstStyle/>
+              <a:p>
+                <a:pPr algn="ctr"/>
+                <a14:m>
+                  <m:oMathPara xmlns:m="http://schemas.openxmlformats.org/officeDocument/2006/math">
+                    <m:oMathParaPr>
+                      <m:jc m:val="centerGroup"/>
+                    </m:oMathParaPr>
                     <m:oMath xmlns:m="http://schemas.openxmlformats.org/officeDocument/2006/math">
                       <m:r>
                         <a:rPr lang="en-US" sz="2400" b="0" i="1" smtClean="0">
                           <a:latin typeface="Cambria Math" panose="02040503050406030204" pitchFamily="18" charset="0"/>
+                          <a:ea typeface="Cambria Math" panose="02040503050406030204" pitchFamily="18" charset="0"/>
                         </a:rPr>
-                        <m:t>𝑑</m:t>
+                        <m:t>𝜃</m:t>
                       </m:r>
                     </m:oMath>
-                  </a14:m>
-                  <a:r>
-                    <a:rPr lang="en-US" dirty="0"/>
-                    <a:t> </a:t>
-                  </a:r>
-                </a:p>
-              </p:txBody>
-            </p:sp>
-          </mc:Choice>
-          <mc:Fallback>
-            <p:sp>
-              <p:nvSpPr>
-                <p:cNvPr id="9" name="TextBox 8">
-                  <a:extLst>
-                    <a:ext uri="{FF2B5EF4-FFF2-40B4-BE49-F238E27FC236}">
-                      <a16:creationId xmlns:a16="http://schemas.microsoft.com/office/drawing/2014/main" id="{69848FE8-6C0D-07FD-9867-8D17363ED48A}"/>
-                    </a:ext>
-                  </a:extLst>
-                </p:cNvPr>
-                <p:cNvSpPr txBox="1">
-                  <a:spLocks noRot="1" noChangeAspect="1" noMove="1" noResize="1" noEditPoints="1" noAdjustHandles="1" noChangeArrowheads="1" noChangeShapeType="1" noTextEdit="1"/>
-                </p:cNvSpPr>
-                <p:nvPr/>
-              </p:nvSpPr>
-              <p:spPr>
-                <a:xfrm>
-                  <a:off x="1620522" y="5681120"/>
-                  <a:ext cx="533400" cy="453137"/>
-                </a:xfrm>
-                <a:prstGeom prst="rect">
-                  <a:avLst/>
-                </a:prstGeom>
-                <a:blipFill>
-                  <a:blip r:embed="rId2"/>
-                  <a:stretch>
-                    <a:fillRect/>
-                  </a:stretch>
-                </a:blipFill>
-              </p:spPr>
-              <p:txBody>
-                <a:bodyPr/>
-                <a:lstStyle/>
-                <a:p>
-                  <a:r>
-                    <a:rPr lang="en-US">
-                      <a:noFill/>
-                    </a:rPr>
-                    <a:t> </a:t>
-                  </a:r>
-                </a:p>
-              </p:txBody>
-            </p:sp>
-          </mc:Fallback>
-        </mc:AlternateContent>
-        <mc:AlternateContent xmlns:mc="http://schemas.openxmlformats.org/markup-compatibility/2006">
-          <mc:Choice xmlns:a14="http://schemas.microsoft.com/office/drawing/2010/main" Requires="a14">
-            <p:sp>
-              <p:nvSpPr>
-                <p:cNvPr id="10" name="TextBox 9">
-                  <a:extLst>
-                    <a:ext uri="{FF2B5EF4-FFF2-40B4-BE49-F238E27FC236}">
-                      <a16:creationId xmlns:a16="http://schemas.microsoft.com/office/drawing/2014/main" id="{F41E5177-27A4-ADC7-AE35-2B2712768B5B}"/>
-                    </a:ext>
-                  </a:extLst>
-                </p:cNvPr>
-                <p:cNvSpPr txBox="1"/>
-                <p:nvPr/>
-              </p:nvSpPr>
-              <p:spPr>
-                <a:xfrm>
-                  <a:off x="1365092" y="4824290"/>
-                  <a:ext cx="533400" cy="461665"/>
-                </a:xfrm>
-                <a:prstGeom prst="rect">
-                  <a:avLst/>
-                </a:prstGeom>
-                <a:noFill/>
-              </p:spPr>
-              <p:txBody>
-                <a:bodyPr wrap="square" rtlCol="0">
-                  <a:spAutoFit/>
-                </a:bodyPr>
-                <a:lstStyle/>
-                <a:p>
-                  <a:pPr algn="ctr"/>
-                  <a14:m>
-                    <m:oMathPara xmlns:m="http://schemas.openxmlformats.org/officeDocument/2006/math">
-                      <m:oMathParaPr>
-                        <m:jc m:val="centerGroup"/>
-                      </m:oMathParaPr>
-                      <m:oMath xmlns:m="http://schemas.openxmlformats.org/officeDocument/2006/math">
-                        <m:r>
-                          <a:rPr lang="en-US" sz="2400" b="0" i="1" smtClean="0">
-                            <a:latin typeface="Cambria Math" panose="02040503050406030204" pitchFamily="18" charset="0"/>
-                            <a:ea typeface="Cambria Math" panose="02040503050406030204" pitchFamily="18" charset="0"/>
-                          </a:rPr>
-                          <m:t>𝜃</m:t>
-                        </m:r>
-                      </m:oMath>
-                    </m:oMathPara>
-                  </a14:m>
-                  <a:endParaRPr lang="en-US" dirty="0"/>
-                </a:p>
-              </p:txBody>
-            </p:sp>
-          </mc:Choice>
-          <mc:Fallback>
-            <p:sp>
-              <p:nvSpPr>
-                <p:cNvPr id="10" name="TextBox 9">
-                  <a:extLst>
-                    <a:ext uri="{FF2B5EF4-FFF2-40B4-BE49-F238E27FC236}">
-                      <a16:creationId xmlns:a16="http://schemas.microsoft.com/office/drawing/2014/main" id="{F41E5177-27A4-ADC7-AE35-2B2712768B5B}"/>
-                    </a:ext>
-                  </a:extLst>
-                </p:cNvPr>
-                <p:cNvSpPr txBox="1">
-                  <a:spLocks noRot="1" noChangeAspect="1" noMove="1" noResize="1" noEditPoints="1" noAdjustHandles="1" noChangeArrowheads="1" noChangeShapeType="1" noTextEdit="1"/>
-                </p:cNvSpPr>
-                <p:nvPr/>
-              </p:nvSpPr>
-              <p:spPr>
-                <a:xfrm>
-                  <a:off x="1365092" y="4824290"/>
-                  <a:ext cx="533400" cy="461665"/>
-                </a:xfrm>
-                <a:prstGeom prst="rect">
-                  <a:avLst/>
-                </a:prstGeom>
-                <a:blipFill>
-                  <a:blip r:embed="rId3"/>
-                  <a:stretch>
-                    <a:fillRect/>
-                  </a:stretch>
-                </a:blipFill>
-              </p:spPr>
-              <p:txBody>
-                <a:bodyPr/>
-                <a:lstStyle/>
-                <a:p>
-                  <a:r>
-                    <a:rPr lang="en-US">
-                      <a:noFill/>
-                    </a:rPr>
-                    <a:t> </a:t>
-                  </a:r>
-                </a:p>
-              </p:txBody>
-            </p:sp>
-          </mc:Fallback>
-        </mc:AlternateContent>
-      </p:grpSp>
+                  </m:oMathPara>
+                </a14:m>
+                <a:endParaRPr lang="en-US" dirty="0"/>
+              </a:p>
+            </p:txBody>
+          </p:sp>
+        </mc:Choice>
+        <mc:Fallback>
+          <p:sp>
+            <p:nvSpPr>
+              <p:cNvPr id="10" name="TextBox 9">
+                <a:extLst>
+                  <a:ext uri="{FF2B5EF4-FFF2-40B4-BE49-F238E27FC236}">
+                    <a16:creationId xmlns:a16="http://schemas.microsoft.com/office/drawing/2014/main" id="{F41E5177-27A4-ADC7-AE35-2B2712768B5B}"/>
+                  </a:ext>
+                </a:extLst>
+              </p:cNvPr>
+              <p:cNvSpPr txBox="1">
+                <a:spLocks noRot="1" noChangeAspect="1" noMove="1" noResize="1" noEditPoints="1" noAdjustHandles="1" noChangeArrowheads="1" noChangeShapeType="1" noTextEdit="1"/>
+              </p:cNvSpPr>
+              <p:nvPr/>
+            </p:nvSpPr>
+            <p:spPr>
+              <a:xfrm>
+                <a:off x="1495946" y="4993573"/>
+                <a:ext cx="533400" cy="461665"/>
+              </a:xfrm>
+              <a:prstGeom prst="rect">
+                <a:avLst/>
+              </a:prstGeom>
+              <a:blipFill>
+                <a:blip r:embed="rId3"/>
+                <a:stretch>
+                  <a:fillRect/>
+                </a:stretch>
+              </a:blipFill>
+            </p:spPr>
+            <p:txBody>
+              <a:bodyPr/>
+              <a:lstStyle/>
+              <a:p>
+                <a:r>
+                  <a:rPr lang="en-US">
+                    <a:noFill/>
+                  </a:rPr>
+                  <a:t> </a:t>
+                </a:r>
+              </a:p>
+            </p:txBody>
+          </p:sp>
+        </mc:Fallback>
+      </mc:AlternateContent>
       <p:sp>
         <p:nvSpPr>
           <p:cNvPr id="13" name="Arc 12">
@@ -13644,6 +13623,100 @@
           </a:p>
         </p:txBody>
       </p:sp>
+      <mc:AlternateContent xmlns:mc="http://schemas.openxmlformats.org/markup-compatibility/2006">
+        <mc:Choice xmlns:a14="http://schemas.microsoft.com/office/drawing/2010/main" Requires="a14">
+          <p:sp>
+            <p:nvSpPr>
+              <p:cNvPr id="2" name="TextBox 1">
+                <a:extLst>
+                  <a:ext uri="{FF2B5EF4-FFF2-40B4-BE49-F238E27FC236}">
+                    <a16:creationId xmlns:a16="http://schemas.microsoft.com/office/drawing/2014/main" id="{80C721A1-6BF9-7625-B03F-ED019E61ABBB}"/>
+                  </a:ext>
+                </a:extLst>
+              </p:cNvPr>
+              <p:cNvSpPr txBox="1"/>
+              <p:nvPr/>
+            </p:nvSpPr>
+            <p:spPr>
+              <a:xfrm>
+                <a:off x="1707374" y="4730666"/>
+                <a:ext cx="533400" cy="453137"/>
+              </a:xfrm>
+              <a:prstGeom prst="rect">
+                <a:avLst/>
+              </a:prstGeom>
+              <a:noFill/>
+            </p:spPr>
+            <p:txBody>
+              <a:bodyPr wrap="square" rtlCol="0">
+                <a:spAutoFit/>
+              </a:bodyPr>
+              <a:lstStyle/>
+              <a:p>
+                <a:pPr algn="ctr"/>
+                <a14:m>
+                  <m:oMath xmlns:m="http://schemas.openxmlformats.org/officeDocument/2006/math">
+                    <m:r>
+                      <a:rPr lang="en-US" sz="2400" b="0" i="1" smtClean="0">
+                        <a:latin typeface="Cambria Math" panose="02040503050406030204" pitchFamily="18" charset="0"/>
+                      </a:rPr>
+                      <m:t>𝑟</m:t>
+                    </m:r>
+                  </m:oMath>
+                </a14:m>
+                <a:r>
+                  <a:rPr lang="en-US" dirty="0"/>
+                  <a:t> </a:t>
+                </a:r>
+              </a:p>
+            </p:txBody>
+          </p:sp>
+        </mc:Choice>
+        <mc:Fallback>
+          <p:sp>
+            <p:nvSpPr>
+              <p:cNvPr id="2" name="TextBox 1">
+                <a:extLst>
+                  <a:ext uri="{FF2B5EF4-FFF2-40B4-BE49-F238E27FC236}">
+                    <a16:creationId xmlns:a16="http://schemas.microsoft.com/office/drawing/2014/main" id="{80C721A1-6BF9-7625-B03F-ED019E61ABBB}"/>
+                  </a:ext>
+                </a:extLst>
+              </p:cNvPr>
+              <p:cNvSpPr txBox="1">
+                <a:spLocks noRot="1" noChangeAspect="1" noMove="1" noResize="1" noEditPoints="1" noAdjustHandles="1" noChangeArrowheads="1" noChangeShapeType="1" noTextEdit="1"/>
+              </p:cNvSpPr>
+              <p:nvPr/>
+            </p:nvSpPr>
+            <p:spPr>
+              <a:xfrm>
+                <a:off x="1707374" y="4730666"/>
+                <a:ext cx="533400" cy="453137"/>
+              </a:xfrm>
+              <a:prstGeom prst="rect">
+                <a:avLst/>
+              </a:prstGeom>
+              <a:blipFill>
+                <a:blip r:embed="rId4"/>
+                <a:stretch>
+                  <a:fillRect/>
+                </a:stretch>
+              </a:blipFill>
+            </p:spPr>
+            <p:txBody>
+              <a:bodyPr/>
+              <a:lstStyle/>
+              <a:p>
+                <a:r>
+                  <a:rPr lang="en-US">
+                    <a:noFill/>
+                  </a:rPr>
+                  <a:t> </a:t>
+                </a:r>
+              </a:p>
+            </p:txBody>
+          </p:sp>
+        </mc:Fallback>
+      </mc:AlternateContent>
     </p:spTree>
     <p:extLst>
       <p:ext uri="{BB962C8B-B14F-4D97-AF65-F5344CB8AC3E}">

</xml_diff>